<commit_message>
Add more comments + better tests
</commit_message>
<xml_diff>
--- a/PptxTemplater.Tests/files/ReplaceTablesInAllSlides.pptx
+++ b/PptxTemplater.Tests/files/ReplaceTablesInAllSlides.pptx
@@ -7,6 +7,7 @@
   <p:sldIdLst>
     <p:sldId id="256" r:id="rId2"/>
     <p:sldId id="257" r:id="rId3"/>
+    <p:sldId id="258" r:id="rId4"/>
   </p:sldIdLst>
   <p:sldSz cx="9144000" cy="6858000" type="screen4x3"/>
   <p:notesSz cx="6858000" cy="9144000"/>
@@ -289,7 +290,7 @@
           <a:p>
             <a:fld id="{D93C2CB2-4696-40DF-98DC-663CFCB4B63C}" type="datetimeFigureOut">
               <a:rPr lang="fr-FR" smtClean="0"/>
-              <a:t>20/09/2012</a:t>
+              <a:t>24/09/2012</a:t>
             </a:fld>
             <a:endParaRPr lang="fr-FR"/>
           </a:p>
@@ -459,7 +460,7 @@
           <a:p>
             <a:fld id="{D93C2CB2-4696-40DF-98DC-663CFCB4B63C}" type="datetimeFigureOut">
               <a:rPr lang="fr-FR" smtClean="0"/>
-              <a:t>20/09/2012</a:t>
+              <a:t>24/09/2012</a:t>
             </a:fld>
             <a:endParaRPr lang="fr-FR"/>
           </a:p>
@@ -639,7 +640,7 @@
           <a:p>
             <a:fld id="{D93C2CB2-4696-40DF-98DC-663CFCB4B63C}" type="datetimeFigureOut">
               <a:rPr lang="fr-FR" smtClean="0"/>
-              <a:t>20/09/2012</a:t>
+              <a:t>24/09/2012</a:t>
             </a:fld>
             <a:endParaRPr lang="fr-FR"/>
           </a:p>
@@ -809,7 +810,7 @@
           <a:p>
             <a:fld id="{D93C2CB2-4696-40DF-98DC-663CFCB4B63C}" type="datetimeFigureOut">
               <a:rPr lang="fr-FR" smtClean="0"/>
-              <a:t>20/09/2012</a:t>
+              <a:t>24/09/2012</a:t>
             </a:fld>
             <a:endParaRPr lang="fr-FR"/>
           </a:p>
@@ -1055,7 +1056,7 @@
           <a:p>
             <a:fld id="{D93C2CB2-4696-40DF-98DC-663CFCB4B63C}" type="datetimeFigureOut">
               <a:rPr lang="fr-FR" smtClean="0"/>
-              <a:t>20/09/2012</a:t>
+              <a:t>24/09/2012</a:t>
             </a:fld>
             <a:endParaRPr lang="fr-FR"/>
           </a:p>
@@ -1343,7 +1344,7 @@
           <a:p>
             <a:fld id="{D93C2CB2-4696-40DF-98DC-663CFCB4B63C}" type="datetimeFigureOut">
               <a:rPr lang="fr-FR" smtClean="0"/>
-              <a:t>20/09/2012</a:t>
+              <a:t>24/09/2012</a:t>
             </a:fld>
             <a:endParaRPr lang="fr-FR"/>
           </a:p>
@@ -1765,7 +1766,7 @@
           <a:p>
             <a:fld id="{D93C2CB2-4696-40DF-98DC-663CFCB4B63C}" type="datetimeFigureOut">
               <a:rPr lang="fr-FR" smtClean="0"/>
-              <a:t>20/09/2012</a:t>
+              <a:t>24/09/2012</a:t>
             </a:fld>
             <a:endParaRPr lang="fr-FR"/>
           </a:p>
@@ -1883,7 +1884,7 @@
           <a:p>
             <a:fld id="{D93C2CB2-4696-40DF-98DC-663CFCB4B63C}" type="datetimeFigureOut">
               <a:rPr lang="fr-FR" smtClean="0"/>
-              <a:t>20/09/2012</a:t>
+              <a:t>24/09/2012</a:t>
             </a:fld>
             <a:endParaRPr lang="fr-FR"/>
           </a:p>
@@ -1978,7 +1979,7 @@
           <a:p>
             <a:fld id="{D93C2CB2-4696-40DF-98DC-663CFCB4B63C}" type="datetimeFigureOut">
               <a:rPr lang="fr-FR" smtClean="0"/>
-              <a:t>20/09/2012</a:t>
+              <a:t>24/09/2012</a:t>
             </a:fld>
             <a:endParaRPr lang="fr-FR"/>
           </a:p>
@@ -2255,7 +2256,7 @@
           <a:p>
             <a:fld id="{D93C2CB2-4696-40DF-98DC-663CFCB4B63C}" type="datetimeFigureOut">
               <a:rPr lang="fr-FR" smtClean="0"/>
-              <a:t>20/09/2012</a:t>
+              <a:t>24/09/2012</a:t>
             </a:fld>
             <a:endParaRPr lang="fr-FR"/>
           </a:p>
@@ -2508,7 +2509,7 @@
           <a:p>
             <a:fld id="{D93C2CB2-4696-40DF-98DC-663CFCB4B63C}" type="datetimeFigureOut">
               <a:rPr lang="fr-FR" smtClean="0"/>
-              <a:t>20/09/2012</a:t>
+              <a:t>24/09/2012</a:t>
             </a:fld>
             <a:endParaRPr lang="fr-FR"/>
           </a:p>
@@ -2721,7 +2722,7 @@
           <a:p>
             <a:fld id="{D93C2CB2-4696-40DF-98DC-663CFCB4B63C}" type="datetimeFigureOut">
               <a:rPr lang="fr-FR" smtClean="0"/>
-              <a:t>20/09/2012</a:t>
+              <a:t>24/09/2012</a:t>
             </a:fld>
             <a:endParaRPr lang="fr-FR"/>
           </a:p>
@@ -4723,6 +4724,65 @@
 </p:sld>
 </file>
 
+<file path=ppt/slides/slide3.xml><?xml version="1.0" encoding="utf-8"?>
+<p:sld xmlns:a="http://schemas.openxmlformats.org/drawingml/2006/main" xmlns:r="http://schemas.openxmlformats.org/officeDocument/2006/relationships" xmlns:p="http://schemas.openxmlformats.org/presentationml/2006/main">
+  <p:cSld>
+    <p:spTree>
+      <p:nvGrpSpPr>
+        <p:cNvPr id="1" name=""/>
+        <p:cNvGrpSpPr/>
+        <p:nvPr/>
+      </p:nvGrpSpPr>
+      <p:grpSpPr>
+        <a:xfrm>
+          <a:off x="0" y="0"/>
+          <a:ext cx="0" cy="0"/>
+          <a:chOff x="0" y="0"/>
+          <a:chExt cx="0" cy="0"/>
+        </a:xfrm>
+      </p:grpSpPr>
+      <p:pic>
+        <p:nvPicPr>
+          <p:cNvPr id="4" name="Espace réservé du contenu 3" title="{{picture1png}}"/>
+          <p:cNvPicPr>
+            <a:picLocks noGrp="1" noChangeAspect="1"/>
+          </p:cNvPicPr>
+          <p:nvPr>
+            <p:ph idx="1"/>
+          </p:nvPr>
+        </p:nvPicPr>
+        <p:blipFill>
+          <a:blip r:embed="rId2">
+            <a:extLst>
+              <a:ext uri="{28A0092B-C50C-407E-A947-70E740481C1C}">
+                <a14:useLocalDpi xmlns:a14="http://schemas.microsoft.com/office/drawing/2010/main" val="0"/>
+              </a:ext>
+            </a:extLst>
+          </a:blip>
+          <a:stretch>
+            <a:fillRect/>
+          </a:stretch>
+        </p:blipFill>
+        <p:spPr>
+          <a:xfrm>
+            <a:off x="4133905" y="3167095"/>
+            <a:ext cx="876191" cy="523810"/>
+          </a:xfrm>
+        </p:spPr>
+      </p:pic>
+    </p:spTree>
+    <p:extLst>
+      <p:ext uri="{BB962C8B-B14F-4D97-AF65-F5344CB8AC3E}">
+        <p14:creationId xmlns:p14="http://schemas.microsoft.com/office/powerpoint/2010/main" val="1315107723"/>
+      </p:ext>
+    </p:extLst>
+  </p:cSld>
+  <p:clrMapOvr>
+    <a:masterClrMapping/>
+  </p:clrMapOvr>
+</p:sld>
+</file>
+
 <file path=ppt/theme/theme1.xml><?xml version="1.0" encoding="utf-8"?>
 <a:theme xmlns:a="http://schemas.openxmlformats.org/drawingml/2006/main" name="Thème Office">
   <a:themeElements>

</xml_diff>

<commit_message>
Improve ReplaceTablesInAllSlides Change PptxTable.SetRows()
</commit_message>
<xml_diff>
--- a/PptxTemplater.Tests/files/ReplaceTablesInAllSlides.pptx
+++ b/PptxTemplater.Tests/files/ReplaceTablesInAllSlides.pptx
@@ -290,7 +290,7 @@
           <a:p>
             <a:fld id="{D93C2CB2-4696-40DF-98DC-663CFCB4B63C}" type="datetimeFigureOut">
               <a:rPr lang="fr-FR" smtClean="0"/>
-              <a:t>24/09/2012</a:t>
+              <a:t>30/10/2012</a:t>
             </a:fld>
             <a:endParaRPr lang="fr-FR"/>
           </a:p>
@@ -332,7 +332,7 @@
           <a:p>
             <a:fld id="{194BFA71-7104-4D3E-816E-B49AC6E88536}" type="slidenum">
               <a:rPr lang="fr-FR" smtClean="0"/>
-              <a:t>‹N°›</a:t>
+              <a:t>‹#›</a:t>
             </a:fld>
             <a:endParaRPr lang="fr-FR"/>
           </a:p>
@@ -460,7 +460,7 @@
           <a:p>
             <a:fld id="{D93C2CB2-4696-40DF-98DC-663CFCB4B63C}" type="datetimeFigureOut">
               <a:rPr lang="fr-FR" smtClean="0"/>
-              <a:t>24/09/2012</a:t>
+              <a:t>30/10/2012</a:t>
             </a:fld>
             <a:endParaRPr lang="fr-FR"/>
           </a:p>
@@ -502,7 +502,7 @@
           <a:p>
             <a:fld id="{194BFA71-7104-4D3E-816E-B49AC6E88536}" type="slidenum">
               <a:rPr lang="fr-FR" smtClean="0"/>
-              <a:t>‹N°›</a:t>
+              <a:t>‹#›</a:t>
             </a:fld>
             <a:endParaRPr lang="fr-FR"/>
           </a:p>
@@ -640,7 +640,7 @@
           <a:p>
             <a:fld id="{D93C2CB2-4696-40DF-98DC-663CFCB4B63C}" type="datetimeFigureOut">
               <a:rPr lang="fr-FR" smtClean="0"/>
-              <a:t>24/09/2012</a:t>
+              <a:t>30/10/2012</a:t>
             </a:fld>
             <a:endParaRPr lang="fr-FR"/>
           </a:p>
@@ -682,7 +682,7 @@
           <a:p>
             <a:fld id="{194BFA71-7104-4D3E-816E-B49AC6E88536}" type="slidenum">
               <a:rPr lang="fr-FR" smtClean="0"/>
-              <a:t>‹N°›</a:t>
+              <a:t>‹#›</a:t>
             </a:fld>
             <a:endParaRPr lang="fr-FR"/>
           </a:p>
@@ -810,7 +810,7 @@
           <a:p>
             <a:fld id="{D93C2CB2-4696-40DF-98DC-663CFCB4B63C}" type="datetimeFigureOut">
               <a:rPr lang="fr-FR" smtClean="0"/>
-              <a:t>24/09/2012</a:t>
+              <a:t>30/10/2012</a:t>
             </a:fld>
             <a:endParaRPr lang="fr-FR"/>
           </a:p>
@@ -852,7 +852,7 @@
           <a:p>
             <a:fld id="{194BFA71-7104-4D3E-816E-B49AC6E88536}" type="slidenum">
               <a:rPr lang="fr-FR" smtClean="0"/>
-              <a:t>‹N°›</a:t>
+              <a:t>‹#›</a:t>
             </a:fld>
             <a:endParaRPr lang="fr-FR"/>
           </a:p>
@@ -1056,7 +1056,7 @@
           <a:p>
             <a:fld id="{D93C2CB2-4696-40DF-98DC-663CFCB4B63C}" type="datetimeFigureOut">
               <a:rPr lang="fr-FR" smtClean="0"/>
-              <a:t>24/09/2012</a:t>
+              <a:t>30/10/2012</a:t>
             </a:fld>
             <a:endParaRPr lang="fr-FR"/>
           </a:p>
@@ -1098,7 +1098,7 @@
           <a:p>
             <a:fld id="{194BFA71-7104-4D3E-816E-B49AC6E88536}" type="slidenum">
               <a:rPr lang="fr-FR" smtClean="0"/>
-              <a:t>‹N°›</a:t>
+              <a:t>‹#›</a:t>
             </a:fld>
             <a:endParaRPr lang="fr-FR"/>
           </a:p>
@@ -1344,7 +1344,7 @@
           <a:p>
             <a:fld id="{D93C2CB2-4696-40DF-98DC-663CFCB4B63C}" type="datetimeFigureOut">
               <a:rPr lang="fr-FR" smtClean="0"/>
-              <a:t>24/09/2012</a:t>
+              <a:t>30/10/2012</a:t>
             </a:fld>
             <a:endParaRPr lang="fr-FR"/>
           </a:p>
@@ -1386,7 +1386,7 @@
           <a:p>
             <a:fld id="{194BFA71-7104-4D3E-816E-B49AC6E88536}" type="slidenum">
               <a:rPr lang="fr-FR" smtClean="0"/>
-              <a:t>‹N°›</a:t>
+              <a:t>‹#›</a:t>
             </a:fld>
             <a:endParaRPr lang="fr-FR"/>
           </a:p>
@@ -1766,7 +1766,7 @@
           <a:p>
             <a:fld id="{D93C2CB2-4696-40DF-98DC-663CFCB4B63C}" type="datetimeFigureOut">
               <a:rPr lang="fr-FR" smtClean="0"/>
-              <a:t>24/09/2012</a:t>
+              <a:t>30/10/2012</a:t>
             </a:fld>
             <a:endParaRPr lang="fr-FR"/>
           </a:p>
@@ -1808,7 +1808,7 @@
           <a:p>
             <a:fld id="{194BFA71-7104-4D3E-816E-B49AC6E88536}" type="slidenum">
               <a:rPr lang="fr-FR" smtClean="0"/>
-              <a:t>‹N°›</a:t>
+              <a:t>‹#›</a:t>
             </a:fld>
             <a:endParaRPr lang="fr-FR"/>
           </a:p>
@@ -1884,7 +1884,7 @@
           <a:p>
             <a:fld id="{D93C2CB2-4696-40DF-98DC-663CFCB4B63C}" type="datetimeFigureOut">
               <a:rPr lang="fr-FR" smtClean="0"/>
-              <a:t>24/09/2012</a:t>
+              <a:t>30/10/2012</a:t>
             </a:fld>
             <a:endParaRPr lang="fr-FR"/>
           </a:p>
@@ -1926,7 +1926,7 @@
           <a:p>
             <a:fld id="{194BFA71-7104-4D3E-816E-B49AC6E88536}" type="slidenum">
               <a:rPr lang="fr-FR" smtClean="0"/>
-              <a:t>‹N°›</a:t>
+              <a:t>‹#›</a:t>
             </a:fld>
             <a:endParaRPr lang="fr-FR"/>
           </a:p>
@@ -1979,7 +1979,7 @@
           <a:p>
             <a:fld id="{D93C2CB2-4696-40DF-98DC-663CFCB4B63C}" type="datetimeFigureOut">
               <a:rPr lang="fr-FR" smtClean="0"/>
-              <a:t>24/09/2012</a:t>
+              <a:t>30/10/2012</a:t>
             </a:fld>
             <a:endParaRPr lang="fr-FR"/>
           </a:p>
@@ -2021,7 +2021,7 @@
           <a:p>
             <a:fld id="{194BFA71-7104-4D3E-816E-B49AC6E88536}" type="slidenum">
               <a:rPr lang="fr-FR" smtClean="0"/>
-              <a:t>‹N°›</a:t>
+              <a:t>‹#›</a:t>
             </a:fld>
             <a:endParaRPr lang="fr-FR"/>
           </a:p>
@@ -2256,7 +2256,7 @@
           <a:p>
             <a:fld id="{D93C2CB2-4696-40DF-98DC-663CFCB4B63C}" type="datetimeFigureOut">
               <a:rPr lang="fr-FR" smtClean="0"/>
-              <a:t>24/09/2012</a:t>
+              <a:t>30/10/2012</a:t>
             </a:fld>
             <a:endParaRPr lang="fr-FR"/>
           </a:p>
@@ -2298,7 +2298,7 @@
           <a:p>
             <a:fld id="{194BFA71-7104-4D3E-816E-B49AC6E88536}" type="slidenum">
               <a:rPr lang="fr-FR" smtClean="0"/>
-              <a:t>‹N°›</a:t>
+              <a:t>‹#›</a:t>
             </a:fld>
             <a:endParaRPr lang="fr-FR"/>
           </a:p>
@@ -2509,7 +2509,7 @@
           <a:p>
             <a:fld id="{D93C2CB2-4696-40DF-98DC-663CFCB4B63C}" type="datetimeFigureOut">
               <a:rPr lang="fr-FR" smtClean="0"/>
-              <a:t>24/09/2012</a:t>
+              <a:t>30/10/2012</a:t>
             </a:fld>
             <a:endParaRPr lang="fr-FR"/>
           </a:p>
@@ -2551,7 +2551,7 @@
           <a:p>
             <a:fld id="{194BFA71-7104-4D3E-816E-B49AC6E88536}" type="slidenum">
               <a:rPr lang="fr-FR" smtClean="0"/>
-              <a:t>‹N°›</a:t>
+              <a:t>‹#›</a:t>
             </a:fld>
             <a:endParaRPr lang="fr-FR"/>
           </a:p>
@@ -2722,7 +2722,7 @@
           <a:p>
             <a:fld id="{D93C2CB2-4696-40DF-98DC-663CFCB4B63C}" type="datetimeFigureOut">
               <a:rPr lang="fr-FR" smtClean="0"/>
-              <a:t>24/09/2012</a:t>
+              <a:t>30/10/2012</a:t>
             </a:fld>
             <a:endParaRPr lang="fr-FR"/>
           </a:p>
@@ -2800,7 +2800,7 @@
           <a:p>
             <a:fld id="{194BFA71-7104-4D3E-816E-B49AC6E88536}" type="slidenum">
               <a:rPr lang="fr-FR" smtClean="0"/>
-              <a:t>‹N°›</a:t>
+              <a:t>‹#›</a:t>
             </a:fld>
             <a:endParaRPr lang="fr-FR"/>
           </a:p>
@@ -3097,548 +3097,6 @@
           <a:chExt cx="0" cy="0"/>
         </a:xfrm>
       </p:grpSpPr>
-      <p:graphicFrame>
-        <p:nvGraphicFramePr>
-          <p:cNvPr id="4" name="Tableau 3" title="{{table1}}"/>
-          <p:cNvGraphicFramePr>
-            <a:graphicFrameLocks noGrp="1"/>
-          </p:cNvGraphicFramePr>
-          <p:nvPr>
-            <p:extLst>
-              <p:ext uri="{D42A27DB-BD31-4B8C-83A1-F6EECF244321}">
-                <p14:modId xmlns:p14="http://schemas.microsoft.com/office/powerpoint/2010/main" val="2120365785"/>
-              </p:ext>
-            </p:extLst>
-          </p:nvPr>
-        </p:nvGraphicFramePr>
-        <p:xfrm>
-          <a:off x="755576" y="692696"/>
-          <a:ext cx="7416828" cy="3279800"/>
-        </p:xfrm>
-        <a:graphic>
-          <a:graphicData uri="http://schemas.openxmlformats.org/drawingml/2006/table">
-            <a:tbl>
-              <a:tblPr firstRow="1" bandRow="1">
-                <a:tableStyleId>{5C22544A-7EE6-4342-B048-85BDC9FD1C3A}</a:tableStyleId>
-              </a:tblPr>
-              <a:tblGrid>
-                <a:gridCol w="1656186"/>
-                <a:gridCol w="1152128"/>
-                <a:gridCol w="1152128"/>
-                <a:gridCol w="1152128"/>
-                <a:gridCol w="1152128"/>
-                <a:gridCol w="1152130"/>
-              </a:tblGrid>
-              <a:tr h="655960">
-                <a:tc>
-                  <a:txBody>
-                    <a:bodyPr/>
-                    <a:lstStyle/>
-                    <a:p>
-                      <a:r>
-                        <a:rPr lang="en-US" dirty="0" smtClean="0"/>
-                        <a:t>Table1</a:t>
-                      </a:r>
-                      <a:endParaRPr lang="fr-FR" dirty="0"/>
-                    </a:p>
-                  </a:txBody>
-                  <a:tcPr/>
-                </a:tc>
-                <a:tc>
-                  <a:txBody>
-                    <a:bodyPr/>
-                    <a:lstStyle/>
-                    <a:p>
-                      <a:r>
-                        <a:rPr lang="en-US" dirty="0" smtClean="0"/>
-                        <a:t>Col2</a:t>
-                      </a:r>
-                      <a:endParaRPr lang="fr-FR" dirty="0"/>
-                    </a:p>
-                  </a:txBody>
-                  <a:tcPr/>
-                </a:tc>
-                <a:tc>
-                  <a:txBody>
-                    <a:bodyPr/>
-                    <a:lstStyle/>
-                    <a:p>
-                      <a:r>
-                        <a:rPr lang="en-US" dirty="0" smtClean="0"/>
-                        <a:t>Col3</a:t>
-                      </a:r>
-                      <a:endParaRPr lang="fr-FR" dirty="0"/>
-                    </a:p>
-                  </a:txBody>
-                  <a:tcPr/>
-                </a:tc>
-                <a:tc>
-                  <a:txBody>
-                    <a:bodyPr/>
-                    <a:lstStyle/>
-                    <a:p>
-                      <a:r>
-                        <a:rPr lang="en-US" dirty="0" smtClean="0"/>
-                        <a:t>Col4</a:t>
-                      </a:r>
-                      <a:endParaRPr lang="fr-FR" dirty="0"/>
-                    </a:p>
-                  </a:txBody>
-                  <a:tcPr/>
-                </a:tc>
-                <a:tc>
-                  <a:txBody>
-                    <a:bodyPr/>
-                    <a:lstStyle/>
-                    <a:p>
-                      <a:r>
-                        <a:rPr lang="en-US" dirty="0" smtClean="0"/>
-                        <a:t>Col5</a:t>
-                      </a:r>
-                      <a:endParaRPr lang="fr-FR" dirty="0"/>
-                    </a:p>
-                  </a:txBody>
-                  <a:tcPr/>
-                </a:tc>
-                <a:tc>
-                  <a:txBody>
-                    <a:bodyPr/>
-                    <a:lstStyle/>
-                    <a:p>
-                      <a:r>
-                        <a:rPr lang="en-US" dirty="0" smtClean="0"/>
-                        <a:t>Col6</a:t>
-                      </a:r>
-                      <a:endParaRPr lang="fr-FR" dirty="0"/>
-                    </a:p>
-                  </a:txBody>
-                  <a:tcPr/>
-                </a:tc>
-              </a:tr>
-              <a:tr h="655960">
-                <a:tc>
-                  <a:txBody>
-                    <a:bodyPr/>
-                    <a:lstStyle/>
-                    <a:p>
-                      <a:r>
-                        <a:rPr lang="en-US" sz="2400" b="1" i="1" u="sng" dirty="0" smtClean="0"/>
-                        <a:t>HELLO </a:t>
-                      </a:r>
-                      <a:r>
-                        <a:rPr lang="en-US" sz="900" b="0" i="0" u="none" dirty="0" smtClean="0"/>
-                        <a:t>{{cell1}} </a:t>
-                      </a:r>
-                      <a:endParaRPr lang="fr-FR" sz="2400" b="1" i="1" u="sng" dirty="0"/>
-                    </a:p>
-                  </a:txBody>
-                  <a:tcPr/>
-                </a:tc>
-                <a:tc>
-                  <a:txBody>
-                    <a:bodyPr/>
-                    <a:lstStyle/>
-                    <a:p>
-                      <a:pPr marL="0" marR="0" indent="0" algn="l" defTabSz="914400" rtl="0" eaLnBrk="1" fontAlgn="auto" latinLnBrk="0" hangingPunct="1">
-                        <a:lnSpc>
-                          <a:spcPct val="100000"/>
-                        </a:lnSpc>
-                        <a:spcBef>
-                          <a:spcPts val="0"/>
-                        </a:spcBef>
-                        <a:spcAft>
-                          <a:spcPts val="0"/>
-                        </a:spcAft>
-                        <a:buClrTx/>
-                        <a:buSzTx/>
-                        <a:buFontTx/>
-                        <a:buNone/>
-                        <a:tabLst/>
-                        <a:defRPr/>
-                      </a:pPr>
-                      <a:r>
-                        <a:rPr lang="en-US" dirty="0" smtClean="0"/>
-                        <a:t>{{cell2}}</a:t>
-                      </a:r>
-                      <a:endParaRPr lang="fr-FR" dirty="0" smtClean="0"/>
-                    </a:p>
-                  </a:txBody>
-                  <a:tcPr/>
-                </a:tc>
-                <a:tc>
-                  <a:txBody>
-                    <a:bodyPr/>
-                    <a:lstStyle/>
-                    <a:p>
-                      <a:r>
-                        <a:rPr lang="en-US" dirty="0" smtClean="0"/>
-                        <a:t>{{cell3}}</a:t>
-                      </a:r>
-                      <a:endParaRPr lang="fr-FR" dirty="0"/>
-                    </a:p>
-                  </a:txBody>
-                  <a:tcPr/>
-                </a:tc>
-                <a:tc>
-                  <a:txBody>
-                    <a:bodyPr/>
-                    <a:lstStyle/>
-                    <a:p>
-                      <a:r>
-                        <a:rPr lang="en-US" dirty="0" smtClean="0"/>
-                        <a:t>{{cell4}}</a:t>
-                      </a:r>
-                      <a:endParaRPr lang="fr-FR" dirty="0"/>
-                    </a:p>
-                  </a:txBody>
-                  <a:tcPr/>
-                </a:tc>
-                <a:tc>
-                  <a:txBody>
-                    <a:bodyPr/>
-                    <a:lstStyle/>
-                    <a:p>
-                      <a:r>
-                        <a:rPr lang="en-US" dirty="0" smtClean="0"/>
-                        <a:t>{{cell5}}</a:t>
-                      </a:r>
-                      <a:endParaRPr lang="fr-FR" dirty="0"/>
-                    </a:p>
-                  </a:txBody>
-                  <a:tcPr/>
-                </a:tc>
-                <a:tc>
-                  <a:txBody>
-                    <a:bodyPr/>
-                    <a:lstStyle/>
-                    <a:p>
-                      <a:r>
-                        <a:rPr lang="en-US" dirty="0" smtClean="0"/>
-                        <a:t>{{cell6}}</a:t>
-                      </a:r>
-                      <a:endParaRPr lang="fr-FR" dirty="0"/>
-                    </a:p>
-                  </a:txBody>
-                  <a:tcPr/>
-                </a:tc>
-              </a:tr>
-              <a:tr h="655960">
-                <a:tc>
-                  <a:txBody>
-                    <a:bodyPr/>
-                    <a:lstStyle/>
-                    <a:p>
-                      <a:r>
-                        <a:rPr lang="en-US" sz="1800" b="0" i="0" u="none" dirty="0" smtClean="0"/>
-                        <a:t>{{cell1}}</a:t>
-                      </a:r>
-                      <a:endParaRPr lang="fr-FR" sz="1800" b="1" i="1" u="sng" dirty="0"/>
-                    </a:p>
-                  </a:txBody>
-                  <a:tcPr/>
-                </a:tc>
-                <a:tc>
-                  <a:txBody>
-                    <a:bodyPr/>
-                    <a:lstStyle/>
-                    <a:p>
-                      <a:pPr marL="0" marR="0" indent="0" algn="l" defTabSz="914400" rtl="0" eaLnBrk="1" fontAlgn="auto" latinLnBrk="0" hangingPunct="1">
-                        <a:lnSpc>
-                          <a:spcPct val="100000"/>
-                        </a:lnSpc>
-                        <a:spcBef>
-                          <a:spcPts val="0"/>
-                        </a:spcBef>
-                        <a:spcAft>
-                          <a:spcPts val="0"/>
-                        </a:spcAft>
-                        <a:buClrTx/>
-                        <a:buSzTx/>
-                        <a:buFontTx/>
-                        <a:buNone/>
-                        <a:tabLst/>
-                        <a:defRPr/>
-                      </a:pPr>
-                      <a:r>
-                        <a:rPr lang="en-US" dirty="0" smtClean="0"/>
-                        <a:t>{{cell2}}</a:t>
-                      </a:r>
-                      <a:endParaRPr lang="fr-FR" dirty="0" smtClean="0"/>
-                    </a:p>
-                  </a:txBody>
-                  <a:tcPr/>
-                </a:tc>
-                <a:tc>
-                  <a:txBody>
-                    <a:bodyPr/>
-                    <a:lstStyle/>
-                    <a:p>
-                      <a:r>
-                        <a:rPr lang="en-US" dirty="0" smtClean="0"/>
-                        <a:t>{{cell3}}</a:t>
-                      </a:r>
-                      <a:endParaRPr lang="fr-FR" dirty="0"/>
-                    </a:p>
-                  </a:txBody>
-                  <a:tcPr/>
-                </a:tc>
-                <a:tc>
-                  <a:txBody>
-                    <a:bodyPr/>
-                    <a:lstStyle/>
-                    <a:p>
-                      <a:r>
-                        <a:rPr lang="en-US" dirty="0" smtClean="0"/>
-                        <a:t>{{cell4}}</a:t>
-                      </a:r>
-                      <a:endParaRPr lang="fr-FR" dirty="0"/>
-                    </a:p>
-                  </a:txBody>
-                  <a:tcPr/>
-                </a:tc>
-                <a:tc>
-                  <a:txBody>
-                    <a:bodyPr/>
-                    <a:lstStyle/>
-                    <a:p>
-                      <a:r>
-                        <a:rPr lang="en-US" dirty="0" smtClean="0"/>
-                        <a:t>{{cell5}}</a:t>
-                      </a:r>
-                      <a:endParaRPr lang="fr-FR" dirty="0"/>
-                    </a:p>
-                  </a:txBody>
-                  <a:tcPr/>
-                </a:tc>
-                <a:tc>
-                  <a:txBody>
-                    <a:bodyPr/>
-                    <a:lstStyle/>
-                    <a:p>
-                      <a:r>
-                        <a:rPr lang="en-US" dirty="0" smtClean="0"/>
-                        <a:t>{{cell6}}</a:t>
-                      </a:r>
-                      <a:endParaRPr lang="fr-FR" dirty="0"/>
-                    </a:p>
-                  </a:txBody>
-                  <a:tcPr/>
-                </a:tc>
-              </a:tr>
-              <a:tr h="655960">
-                <a:tc>
-                  <a:txBody>
-                    <a:bodyPr/>
-                    <a:lstStyle/>
-                    <a:p>
-                      <a:r>
-                        <a:rPr lang="en-US" sz="1800" b="0" i="0" u="none" dirty="0" smtClean="0"/>
-                        <a:t>{{cell1}}</a:t>
-                      </a:r>
-                      <a:endParaRPr lang="fr-FR" sz="1800" b="1" i="1" u="sng" dirty="0"/>
-                    </a:p>
-                  </a:txBody>
-                  <a:tcPr/>
-                </a:tc>
-                <a:tc>
-                  <a:txBody>
-                    <a:bodyPr/>
-                    <a:lstStyle/>
-                    <a:p>
-                      <a:pPr marL="0" marR="0" indent="0" algn="l" defTabSz="914400" rtl="0" eaLnBrk="1" fontAlgn="auto" latinLnBrk="0" hangingPunct="1">
-                        <a:lnSpc>
-                          <a:spcPct val="100000"/>
-                        </a:lnSpc>
-                        <a:spcBef>
-                          <a:spcPts val="0"/>
-                        </a:spcBef>
-                        <a:spcAft>
-                          <a:spcPts val="0"/>
-                        </a:spcAft>
-                        <a:buClrTx/>
-                        <a:buSzTx/>
-                        <a:buFontTx/>
-                        <a:buNone/>
-                        <a:tabLst/>
-                        <a:defRPr/>
-                      </a:pPr>
-                      <a:r>
-                        <a:rPr lang="en-US" dirty="0" smtClean="0"/>
-                        <a:t>{{cell2}}</a:t>
-                      </a:r>
-                      <a:endParaRPr lang="fr-FR" dirty="0" smtClean="0"/>
-                    </a:p>
-                  </a:txBody>
-                  <a:tcPr/>
-                </a:tc>
-                <a:tc>
-                  <a:txBody>
-                    <a:bodyPr/>
-                    <a:lstStyle/>
-                    <a:p>
-                      <a:r>
-                        <a:rPr lang="en-US" dirty="0" smtClean="0"/>
-                        <a:t>{{cell3}}</a:t>
-                      </a:r>
-                      <a:endParaRPr lang="fr-FR" dirty="0"/>
-                    </a:p>
-                  </a:txBody>
-                  <a:tcPr/>
-                </a:tc>
-                <a:tc>
-                  <a:txBody>
-                    <a:bodyPr/>
-                    <a:lstStyle/>
-                    <a:p>
-                      <a:r>
-                        <a:rPr lang="en-US" dirty="0" smtClean="0"/>
-                        <a:t>{{cell4}}</a:t>
-                      </a:r>
-                      <a:endParaRPr lang="fr-FR" dirty="0"/>
-                    </a:p>
-                  </a:txBody>
-                  <a:tcPr/>
-                </a:tc>
-                <a:tc>
-                  <a:txBody>
-                    <a:bodyPr/>
-                    <a:lstStyle/>
-                    <a:p>
-                      <a:r>
-                        <a:rPr lang="en-US" dirty="0" smtClean="0"/>
-                        <a:t>{{cell5}}</a:t>
-                      </a:r>
-                      <a:endParaRPr lang="fr-FR" dirty="0"/>
-                    </a:p>
-                  </a:txBody>
-                  <a:tcPr/>
-                </a:tc>
-                <a:tc>
-                  <a:txBody>
-                    <a:bodyPr/>
-                    <a:lstStyle/>
-                    <a:p>
-                      <a:r>
-                        <a:rPr lang="en-US" dirty="0" smtClean="0"/>
-                        <a:t>{{cell6}}</a:t>
-                      </a:r>
-                      <a:endParaRPr lang="fr-FR" dirty="0"/>
-                    </a:p>
-                  </a:txBody>
-                  <a:tcPr/>
-                </a:tc>
-              </a:tr>
-              <a:tr h="655960">
-                <a:tc>
-                  <a:txBody>
-                    <a:bodyPr/>
-                    <a:lstStyle/>
-                    <a:p>
-                      <a:r>
-                        <a:rPr lang="en-US" sz="2400" b="1" i="1" u="sng" dirty="0" smtClean="0"/>
-                        <a:t>HELLO </a:t>
-                      </a:r>
-                      <a:r>
-                        <a:rPr lang="en-US" sz="900" b="0" i="0" u="none" dirty="0" smtClean="0"/>
-                        <a:t>{{cell1}}</a:t>
-                      </a:r>
-                      <a:endParaRPr lang="fr-FR" sz="2400" b="1" i="1" u="sng" dirty="0"/>
-                    </a:p>
-                  </a:txBody>
-                  <a:tcPr/>
-                </a:tc>
-                <a:tc>
-                  <a:txBody>
-                    <a:bodyPr/>
-                    <a:lstStyle/>
-                    <a:p>
-                      <a:pPr marL="0" marR="0" indent="0" algn="l" defTabSz="914400" rtl="0" eaLnBrk="1" fontAlgn="auto" latinLnBrk="0" hangingPunct="1">
-                        <a:lnSpc>
-                          <a:spcPct val="100000"/>
-                        </a:lnSpc>
-                        <a:spcBef>
-                          <a:spcPts val="0"/>
-                        </a:spcBef>
-                        <a:spcAft>
-                          <a:spcPts val="0"/>
-                        </a:spcAft>
-                        <a:buClrTx/>
-                        <a:buSzTx/>
-                        <a:buFontTx/>
-                        <a:buNone/>
-                        <a:tabLst/>
-                        <a:defRPr/>
-                      </a:pPr>
-                      <a:r>
-                        <a:rPr lang="en-US" dirty="0" smtClean="0"/>
-                        <a:t>{{cell2}}</a:t>
-                      </a:r>
-                      <a:endParaRPr lang="fr-FR" dirty="0" smtClean="0"/>
-                    </a:p>
-                  </a:txBody>
-                  <a:tcPr/>
-                </a:tc>
-                <a:tc>
-                  <a:txBody>
-                    <a:bodyPr/>
-                    <a:lstStyle/>
-                    <a:p>
-                      <a:r>
-                        <a:rPr lang="en-US" dirty="0" smtClean="0"/>
-                        <a:t>{{cell3}}</a:t>
-                      </a:r>
-                      <a:endParaRPr lang="fr-FR" dirty="0"/>
-                    </a:p>
-                  </a:txBody>
-                  <a:tcPr/>
-                </a:tc>
-                <a:tc>
-                  <a:txBody>
-                    <a:bodyPr/>
-                    <a:lstStyle/>
-                    <a:p>
-                      <a:r>
-                        <a:rPr lang="en-US" dirty="0" smtClean="0"/>
-                        <a:t>{{cell4}}</a:t>
-                      </a:r>
-                      <a:endParaRPr lang="fr-FR" dirty="0"/>
-                    </a:p>
-                  </a:txBody>
-                  <a:tcPr/>
-                </a:tc>
-                <a:tc>
-                  <a:txBody>
-                    <a:bodyPr/>
-                    <a:lstStyle/>
-                    <a:p>
-                      <a:r>
-                        <a:rPr lang="en-US" dirty="0" smtClean="0"/>
-                        <a:t>{{cell5}}</a:t>
-                      </a:r>
-                      <a:endParaRPr lang="fr-FR" dirty="0"/>
-                    </a:p>
-                  </a:txBody>
-                  <a:tcPr/>
-                </a:tc>
-                <a:tc>
-                  <a:txBody>
-                    <a:bodyPr/>
-                    <a:lstStyle/>
-                    <a:p>
-                      <a:r>
-                        <a:rPr lang="en-US" dirty="0" smtClean="0"/>
-                        <a:t>{{cell6}}</a:t>
-                      </a:r>
-                      <a:endParaRPr lang="fr-FR" dirty="0"/>
-                    </a:p>
-                  </a:txBody>
-                  <a:tcPr/>
-                </a:tc>
-              </a:tr>
-            </a:tbl>
-          </a:graphicData>
-        </a:graphic>
-      </p:graphicFrame>
       <p:sp>
         <p:nvSpPr>
           <p:cNvPr id="2" name="Rectangle 1"/>
@@ -3647,7 +3105,7 @@
         </p:nvSpPr>
         <p:spPr>
           <a:xfrm>
-            <a:off x="2942705" y="4797152"/>
+            <a:off x="3257377" y="2967335"/>
             <a:ext cx="2629246" cy="923330"/>
           </a:xfrm>
           <a:prstGeom prst="rect">
@@ -3748,21 +3206,21 @@
       </p:grpSpPr>
       <p:graphicFrame>
         <p:nvGraphicFramePr>
-          <p:cNvPr id="4" name="Tableau 3" title="{{table2}}"/>
+          <p:cNvPr id="4" name="Tableau 3" title="{{table1}}"/>
           <p:cNvGraphicFramePr>
             <a:graphicFrameLocks noGrp="1"/>
           </p:cNvGraphicFramePr>
           <p:nvPr>
             <p:extLst>
               <p:ext uri="{D42A27DB-BD31-4B8C-83A1-F6EECF244321}">
-                <p14:modId xmlns:p14="http://schemas.microsoft.com/office/powerpoint/2010/main" val="2971141184"/>
+                <p14:modId xmlns:p14="http://schemas.microsoft.com/office/powerpoint/2010/main" val="1646425889"/>
               </p:ext>
             </p:extLst>
           </p:nvPr>
         </p:nvGraphicFramePr>
         <p:xfrm>
-          <a:off x="755576" y="692696"/>
-          <a:ext cx="7416828" cy="2623840"/>
+          <a:off x="1187625" y="188640"/>
+          <a:ext cx="6768750" cy="2376263"/>
         </p:xfrm>
         <a:graphic>
           <a:graphicData uri="http://schemas.openxmlformats.org/drawingml/2006/table">
@@ -3771,22 +3229,22 @@
                 <a:tableStyleId>{5C22544A-7EE6-4342-B048-85BDC9FD1C3A}</a:tableStyleId>
               </a:tblPr>
               <a:tblGrid>
-                <a:gridCol w="1656186"/>
-                <a:gridCol w="1152128"/>
-                <a:gridCol w="1152128"/>
-                <a:gridCol w="1152128"/>
-                <a:gridCol w="1152128"/>
-                <a:gridCol w="1152130"/>
+                <a:gridCol w="1511469"/>
+                <a:gridCol w="1051456"/>
+                <a:gridCol w="1051456"/>
+                <a:gridCol w="1051456"/>
+                <a:gridCol w="1051456"/>
+                <a:gridCol w="1051457"/>
               </a:tblGrid>
-              <a:tr h="655960">
-                <a:tc>
-                  <a:txBody>
-                    <a:bodyPr/>
-                    <a:lstStyle/>
-                    <a:p>
-                      <a:r>
-                        <a:rPr lang="en-US" dirty="0" smtClean="0"/>
-                        <a:t>Table2</a:t>
+              <a:tr h="451184">
+                <a:tc>
+                  <a:txBody>
+                    <a:bodyPr/>
+                    <a:lstStyle/>
+                    <a:p>
+                      <a:r>
+                        <a:rPr lang="en-US" dirty="0" smtClean="0"/>
+                        <a:t>Table1</a:t>
                       </a:r>
                       <a:endParaRPr lang="fr-FR" dirty="0"/>
                     </a:p>
@@ -3864,17 +3322,17 @@
                   <a:tcPr/>
                 </a:tc>
               </a:tr>
-              <a:tr h="655960">
-                <a:tc>
-                  <a:txBody>
-                    <a:bodyPr/>
-                    <a:lstStyle/>
-                    <a:p>
-                      <a:r>
-                        <a:rPr lang="en-US" sz="2400" b="1" i="1" u="sng" dirty="0" smtClean="0"/>
+              <a:tr h="641693">
+                <a:tc>
+                  <a:txBody>
+                    <a:bodyPr/>
+                    <a:lstStyle/>
+                    <a:p>
+                      <a:r>
+                        <a:rPr lang="en-US" sz="1800" b="0" i="0" u="none" dirty="0" smtClean="0"/>
                         <a:t>{{cell1}}</a:t>
                       </a:r>
-                      <a:endParaRPr lang="fr-FR" sz="2400" b="1" i="1" u="sng" dirty="0"/>
+                      <a:endParaRPr lang="fr-FR" sz="1800" b="0" i="0" u="none" dirty="0"/>
                     </a:p>
                   </a:txBody>
                   <a:tcPr/>
@@ -3967,7 +3425,7 @@
                   <a:tcPr/>
                 </a:tc>
               </a:tr>
-              <a:tr h="655960">
+              <a:tr h="641693">
                 <a:tc>
                   <a:txBody>
                     <a:bodyPr/>
@@ -4070,7 +3528,7 @@
                   <a:tcPr/>
                 </a:tc>
               </a:tr>
-              <a:tr h="655960">
+              <a:tr h="641693">
                 <a:tc>
                   <a:txBody>
                     <a:bodyPr/>
@@ -4179,20 +3637,554 @@
       </p:graphicFrame>
       <p:graphicFrame>
         <p:nvGraphicFramePr>
-          <p:cNvPr id="3" name="Tableau 2" title="{{table3}}"/>
+          <p:cNvPr id="3" name="Tableau 2" title="{{table2}}"/>
           <p:cNvGraphicFramePr>
             <a:graphicFrameLocks noGrp="1"/>
           </p:cNvGraphicFramePr>
           <p:nvPr>
             <p:extLst>
               <p:ext uri="{D42A27DB-BD31-4B8C-83A1-F6EECF244321}">
-                <p14:modId xmlns:p14="http://schemas.microsoft.com/office/powerpoint/2010/main" val="2938969978"/>
+                <p14:modId xmlns:p14="http://schemas.microsoft.com/office/powerpoint/2010/main" val="3297185260"/>
               </p:ext>
             </p:extLst>
           </p:nvPr>
         </p:nvGraphicFramePr>
         <p:xfrm>
-          <a:off x="1019942" y="4077072"/>
+          <a:off x="1139787" y="2756468"/>
+          <a:ext cx="6864426" cy="1849120"/>
+        </p:xfrm>
+        <a:graphic>
+          <a:graphicData uri="http://schemas.openxmlformats.org/drawingml/2006/table">
+            <a:tbl>
+              <a:tblPr firstRow="1" bandRow="1">
+                <a:tableStyleId>{5C22544A-7EE6-4342-B048-85BDC9FD1C3A}</a:tableStyleId>
+              </a:tblPr>
+              <a:tblGrid>
+                <a:gridCol w="1144071"/>
+                <a:gridCol w="1144071"/>
+                <a:gridCol w="1144071"/>
+                <a:gridCol w="1144071"/>
+                <a:gridCol w="1144071"/>
+                <a:gridCol w="1144071"/>
+              </a:tblGrid>
+              <a:tr h="226824">
+                <a:tc>
+                  <a:txBody>
+                    <a:bodyPr/>
+                    <a:lstStyle/>
+                    <a:p>
+                      <a:r>
+                        <a:rPr lang="en-US" dirty="0" smtClean="0"/>
+                        <a:t>Table2</a:t>
+                      </a:r>
+                      <a:endParaRPr lang="fr-FR" dirty="0"/>
+                    </a:p>
+                  </a:txBody>
+                  <a:tcPr/>
+                </a:tc>
+                <a:tc>
+                  <a:txBody>
+                    <a:bodyPr/>
+                    <a:lstStyle/>
+                    <a:p>
+                      <a:r>
+                        <a:rPr lang="en-US" dirty="0" smtClean="0"/>
+                        <a:t>Col2</a:t>
+                      </a:r>
+                      <a:endParaRPr lang="fr-FR" dirty="0"/>
+                    </a:p>
+                  </a:txBody>
+                  <a:tcPr/>
+                </a:tc>
+                <a:tc>
+                  <a:txBody>
+                    <a:bodyPr/>
+                    <a:lstStyle/>
+                    <a:p>
+                      <a:r>
+                        <a:rPr lang="en-US" dirty="0" smtClean="0"/>
+                        <a:t>Col3</a:t>
+                      </a:r>
+                      <a:endParaRPr lang="fr-FR" dirty="0"/>
+                    </a:p>
+                  </a:txBody>
+                  <a:tcPr/>
+                </a:tc>
+                <a:tc>
+                  <a:txBody>
+                    <a:bodyPr/>
+                    <a:lstStyle/>
+                    <a:p>
+                      <a:r>
+                        <a:rPr lang="en-US" dirty="0" smtClean="0"/>
+                        <a:t>Col4</a:t>
+                      </a:r>
+                      <a:endParaRPr lang="fr-FR" dirty="0"/>
+                    </a:p>
+                  </a:txBody>
+                  <a:tcPr/>
+                </a:tc>
+                <a:tc>
+                  <a:txBody>
+                    <a:bodyPr/>
+                    <a:lstStyle/>
+                    <a:p>
+                      <a:r>
+                        <a:rPr lang="en-US" dirty="0" smtClean="0"/>
+                        <a:t>Col5</a:t>
+                      </a:r>
+                      <a:endParaRPr lang="fr-FR" dirty="0"/>
+                    </a:p>
+                  </a:txBody>
+                  <a:tcPr/>
+                </a:tc>
+                <a:tc>
+                  <a:txBody>
+                    <a:bodyPr/>
+                    <a:lstStyle/>
+                    <a:p>
+                      <a:r>
+                        <a:rPr lang="en-US" dirty="0" smtClean="0"/>
+                        <a:t>Col6</a:t>
+                      </a:r>
+                      <a:endParaRPr lang="fr-FR" dirty="0"/>
+                    </a:p>
+                  </a:txBody>
+                  <a:tcPr/>
+                </a:tc>
+              </a:tr>
+              <a:tr h="370840">
+                <a:tc>
+                  <a:txBody>
+                    <a:bodyPr/>
+                    <a:lstStyle/>
+                    <a:p>
+                      <a:r>
+                        <a:rPr lang="en-US" dirty="0" smtClean="0"/>
+                        <a:t>{{cell1}}</a:t>
+                      </a:r>
+                      <a:endParaRPr lang="fr-FR" dirty="0"/>
+                    </a:p>
+                  </a:txBody>
+                  <a:tcPr/>
+                </a:tc>
+                <a:tc>
+                  <a:txBody>
+                    <a:bodyPr/>
+                    <a:lstStyle/>
+                    <a:p>
+                      <a:pPr marL="0" marR="0" indent="0" algn="l" defTabSz="914400" rtl="0" eaLnBrk="1" fontAlgn="auto" latinLnBrk="0" hangingPunct="1">
+                        <a:lnSpc>
+                          <a:spcPct val="100000"/>
+                        </a:lnSpc>
+                        <a:spcBef>
+                          <a:spcPts val="0"/>
+                        </a:spcBef>
+                        <a:spcAft>
+                          <a:spcPts val="0"/>
+                        </a:spcAft>
+                        <a:buClrTx/>
+                        <a:buSzTx/>
+                        <a:buFontTx/>
+                        <a:buNone/>
+                        <a:tabLst/>
+                        <a:defRPr/>
+                      </a:pPr>
+                      <a:r>
+                        <a:rPr lang="en-US" dirty="0" smtClean="0"/>
+                        <a:t>{{cell2}}</a:t>
+                      </a:r>
+                      <a:endParaRPr lang="fr-FR" dirty="0" smtClean="0"/>
+                    </a:p>
+                  </a:txBody>
+                  <a:tcPr/>
+                </a:tc>
+                <a:tc>
+                  <a:txBody>
+                    <a:bodyPr/>
+                    <a:lstStyle/>
+                    <a:p>
+                      <a:r>
+                        <a:rPr lang="en-US" dirty="0" smtClean="0"/>
+                        <a:t>{{cell3}}</a:t>
+                      </a:r>
+                      <a:endParaRPr lang="fr-FR" dirty="0"/>
+                    </a:p>
+                  </a:txBody>
+                  <a:tcPr/>
+                </a:tc>
+                <a:tc>
+                  <a:txBody>
+                    <a:bodyPr/>
+                    <a:lstStyle/>
+                    <a:p>
+                      <a:r>
+                        <a:rPr lang="en-US" dirty="0" smtClean="0"/>
+                        <a:t>{{cell4}}</a:t>
+                      </a:r>
+                      <a:endParaRPr lang="fr-FR" dirty="0"/>
+                    </a:p>
+                  </a:txBody>
+                  <a:tcPr/>
+                </a:tc>
+                <a:tc>
+                  <a:txBody>
+                    <a:bodyPr/>
+                    <a:lstStyle/>
+                    <a:p>
+                      <a:r>
+                        <a:rPr lang="en-US" dirty="0" smtClean="0"/>
+                        <a:t>{{cell5}}</a:t>
+                      </a:r>
+                      <a:endParaRPr lang="fr-FR" dirty="0"/>
+                    </a:p>
+                  </a:txBody>
+                  <a:tcPr/>
+                </a:tc>
+                <a:tc>
+                  <a:txBody>
+                    <a:bodyPr/>
+                    <a:lstStyle/>
+                    <a:p>
+                      <a:r>
+                        <a:rPr lang="en-US" dirty="0" smtClean="0"/>
+                        <a:t>{{cell6}}</a:t>
+                      </a:r>
+                      <a:endParaRPr lang="fr-FR" dirty="0"/>
+                    </a:p>
+                  </a:txBody>
+                  <a:tcPr/>
+                </a:tc>
+              </a:tr>
+              <a:tr h="370840">
+                <a:tc>
+                  <a:txBody>
+                    <a:bodyPr/>
+                    <a:lstStyle/>
+                    <a:p>
+                      <a:r>
+                        <a:rPr lang="en-US" dirty="0" smtClean="0"/>
+                        <a:t>{{cell1}}</a:t>
+                      </a:r>
+                      <a:endParaRPr lang="fr-FR" dirty="0"/>
+                    </a:p>
+                  </a:txBody>
+                  <a:tcPr/>
+                </a:tc>
+                <a:tc>
+                  <a:txBody>
+                    <a:bodyPr/>
+                    <a:lstStyle/>
+                    <a:p>
+                      <a:pPr marL="0" marR="0" indent="0" algn="l" defTabSz="914400" rtl="0" eaLnBrk="1" fontAlgn="auto" latinLnBrk="0" hangingPunct="1">
+                        <a:lnSpc>
+                          <a:spcPct val="100000"/>
+                        </a:lnSpc>
+                        <a:spcBef>
+                          <a:spcPts val="0"/>
+                        </a:spcBef>
+                        <a:spcAft>
+                          <a:spcPts val="0"/>
+                        </a:spcAft>
+                        <a:buClrTx/>
+                        <a:buSzTx/>
+                        <a:buFontTx/>
+                        <a:buNone/>
+                        <a:tabLst/>
+                        <a:defRPr/>
+                      </a:pPr>
+                      <a:r>
+                        <a:rPr lang="en-US" dirty="0" smtClean="0"/>
+                        <a:t>{{cell2}}</a:t>
+                      </a:r>
+                      <a:endParaRPr lang="fr-FR" dirty="0" smtClean="0"/>
+                    </a:p>
+                  </a:txBody>
+                  <a:tcPr/>
+                </a:tc>
+                <a:tc>
+                  <a:txBody>
+                    <a:bodyPr/>
+                    <a:lstStyle/>
+                    <a:p>
+                      <a:r>
+                        <a:rPr lang="en-US" dirty="0" smtClean="0"/>
+                        <a:t>{{cell3}}</a:t>
+                      </a:r>
+                      <a:endParaRPr lang="fr-FR" dirty="0"/>
+                    </a:p>
+                  </a:txBody>
+                  <a:tcPr/>
+                </a:tc>
+                <a:tc>
+                  <a:txBody>
+                    <a:bodyPr/>
+                    <a:lstStyle/>
+                    <a:p>
+                      <a:r>
+                        <a:rPr lang="en-US" dirty="0" smtClean="0"/>
+                        <a:t>{{cell4}}</a:t>
+                      </a:r>
+                      <a:endParaRPr lang="fr-FR" dirty="0"/>
+                    </a:p>
+                  </a:txBody>
+                  <a:tcPr/>
+                </a:tc>
+                <a:tc>
+                  <a:txBody>
+                    <a:bodyPr/>
+                    <a:lstStyle/>
+                    <a:p>
+                      <a:r>
+                        <a:rPr lang="en-US" dirty="0" smtClean="0"/>
+                        <a:t>{{cell5}}</a:t>
+                      </a:r>
+                      <a:endParaRPr lang="fr-FR" dirty="0"/>
+                    </a:p>
+                  </a:txBody>
+                  <a:tcPr/>
+                </a:tc>
+                <a:tc>
+                  <a:txBody>
+                    <a:bodyPr/>
+                    <a:lstStyle/>
+                    <a:p>
+                      <a:r>
+                        <a:rPr lang="en-US" dirty="0" smtClean="0"/>
+                        <a:t>{{cell6}}</a:t>
+                      </a:r>
+                      <a:endParaRPr lang="fr-FR" dirty="0"/>
+                    </a:p>
+                  </a:txBody>
+                  <a:tcPr/>
+                </a:tc>
+              </a:tr>
+              <a:tr h="370840">
+                <a:tc>
+                  <a:txBody>
+                    <a:bodyPr/>
+                    <a:lstStyle/>
+                    <a:p>
+                      <a:r>
+                        <a:rPr lang="en-US" dirty="0" smtClean="0"/>
+                        <a:t>{{cell1}}</a:t>
+                      </a:r>
+                      <a:endParaRPr lang="fr-FR" dirty="0"/>
+                    </a:p>
+                  </a:txBody>
+                  <a:tcPr/>
+                </a:tc>
+                <a:tc>
+                  <a:txBody>
+                    <a:bodyPr/>
+                    <a:lstStyle/>
+                    <a:p>
+                      <a:pPr marL="0" marR="0" indent="0" algn="l" defTabSz="914400" rtl="0" eaLnBrk="1" fontAlgn="auto" latinLnBrk="0" hangingPunct="1">
+                        <a:lnSpc>
+                          <a:spcPct val="100000"/>
+                        </a:lnSpc>
+                        <a:spcBef>
+                          <a:spcPts val="0"/>
+                        </a:spcBef>
+                        <a:spcAft>
+                          <a:spcPts val="0"/>
+                        </a:spcAft>
+                        <a:buClrTx/>
+                        <a:buSzTx/>
+                        <a:buFontTx/>
+                        <a:buNone/>
+                        <a:tabLst/>
+                        <a:defRPr/>
+                      </a:pPr>
+                      <a:r>
+                        <a:rPr lang="en-US" dirty="0" smtClean="0"/>
+                        <a:t>{{cell2}}</a:t>
+                      </a:r>
+                      <a:endParaRPr lang="fr-FR" dirty="0" smtClean="0"/>
+                    </a:p>
+                  </a:txBody>
+                  <a:tcPr/>
+                </a:tc>
+                <a:tc>
+                  <a:txBody>
+                    <a:bodyPr/>
+                    <a:lstStyle/>
+                    <a:p>
+                      <a:r>
+                        <a:rPr lang="en-US" dirty="0" smtClean="0"/>
+                        <a:t>{{cell3}}</a:t>
+                      </a:r>
+                      <a:endParaRPr lang="fr-FR" dirty="0"/>
+                    </a:p>
+                  </a:txBody>
+                  <a:tcPr/>
+                </a:tc>
+                <a:tc>
+                  <a:txBody>
+                    <a:bodyPr/>
+                    <a:lstStyle/>
+                    <a:p>
+                      <a:r>
+                        <a:rPr lang="en-US" dirty="0" smtClean="0"/>
+                        <a:t>{{cell4}}</a:t>
+                      </a:r>
+                      <a:endParaRPr lang="fr-FR" dirty="0"/>
+                    </a:p>
+                  </a:txBody>
+                  <a:tcPr/>
+                </a:tc>
+                <a:tc>
+                  <a:txBody>
+                    <a:bodyPr/>
+                    <a:lstStyle/>
+                    <a:p>
+                      <a:r>
+                        <a:rPr lang="en-US" dirty="0" smtClean="0"/>
+                        <a:t>{{cell5}}</a:t>
+                      </a:r>
+                      <a:endParaRPr lang="fr-FR" dirty="0"/>
+                    </a:p>
+                  </a:txBody>
+                  <a:tcPr/>
+                </a:tc>
+                <a:tc>
+                  <a:txBody>
+                    <a:bodyPr/>
+                    <a:lstStyle/>
+                    <a:p>
+                      <a:r>
+                        <a:rPr lang="en-US" dirty="0" smtClean="0"/>
+                        <a:t>{{cell6}}</a:t>
+                      </a:r>
+                      <a:endParaRPr lang="fr-FR" dirty="0"/>
+                    </a:p>
+                  </a:txBody>
+                  <a:tcPr/>
+                </a:tc>
+              </a:tr>
+              <a:tr h="370840">
+                <a:tc>
+                  <a:txBody>
+                    <a:bodyPr/>
+                    <a:lstStyle/>
+                    <a:p>
+                      <a:r>
+                        <a:rPr lang="en-US" dirty="0" smtClean="0"/>
+                        <a:t>{{cell1}}</a:t>
+                      </a:r>
+                      <a:endParaRPr lang="fr-FR" dirty="0"/>
+                    </a:p>
+                  </a:txBody>
+                  <a:tcPr/>
+                </a:tc>
+                <a:tc>
+                  <a:txBody>
+                    <a:bodyPr/>
+                    <a:lstStyle/>
+                    <a:p>
+                      <a:pPr marL="0" marR="0" indent="0" algn="l" defTabSz="914400" rtl="0" eaLnBrk="1" fontAlgn="auto" latinLnBrk="0" hangingPunct="1">
+                        <a:lnSpc>
+                          <a:spcPct val="100000"/>
+                        </a:lnSpc>
+                        <a:spcBef>
+                          <a:spcPts val="0"/>
+                        </a:spcBef>
+                        <a:spcAft>
+                          <a:spcPts val="0"/>
+                        </a:spcAft>
+                        <a:buClrTx/>
+                        <a:buSzTx/>
+                        <a:buFontTx/>
+                        <a:buNone/>
+                        <a:tabLst/>
+                        <a:defRPr/>
+                      </a:pPr>
+                      <a:r>
+                        <a:rPr lang="en-US" dirty="0" smtClean="0"/>
+                        <a:t>{{cell2}}</a:t>
+                      </a:r>
+                      <a:endParaRPr lang="fr-FR" dirty="0" smtClean="0"/>
+                    </a:p>
+                  </a:txBody>
+                  <a:tcPr/>
+                </a:tc>
+                <a:tc>
+                  <a:txBody>
+                    <a:bodyPr/>
+                    <a:lstStyle/>
+                    <a:p>
+                      <a:r>
+                        <a:rPr lang="en-US" dirty="0" smtClean="0"/>
+                        <a:t>{{cell3}}</a:t>
+                      </a:r>
+                      <a:endParaRPr lang="fr-FR" dirty="0"/>
+                    </a:p>
+                  </a:txBody>
+                  <a:tcPr/>
+                </a:tc>
+                <a:tc>
+                  <a:txBody>
+                    <a:bodyPr/>
+                    <a:lstStyle/>
+                    <a:p>
+                      <a:r>
+                        <a:rPr lang="en-US" dirty="0" smtClean="0"/>
+                        <a:t>{{cell4}}</a:t>
+                      </a:r>
+                      <a:endParaRPr lang="fr-FR" dirty="0"/>
+                    </a:p>
+                  </a:txBody>
+                  <a:tcPr/>
+                </a:tc>
+                <a:tc>
+                  <a:txBody>
+                    <a:bodyPr/>
+                    <a:lstStyle/>
+                    <a:p>
+                      <a:r>
+                        <a:rPr lang="en-US" dirty="0" smtClean="0"/>
+                        <a:t>{{cell5}}</a:t>
+                      </a:r>
+                      <a:endParaRPr lang="fr-FR" dirty="0"/>
+                    </a:p>
+                  </a:txBody>
+                  <a:tcPr/>
+                </a:tc>
+                <a:tc>
+                  <a:txBody>
+                    <a:bodyPr/>
+                    <a:lstStyle/>
+                    <a:p>
+                      <a:r>
+                        <a:rPr lang="en-US" dirty="0" smtClean="0"/>
+                        <a:t>{{cell6}}</a:t>
+                      </a:r>
+                      <a:endParaRPr lang="fr-FR" dirty="0"/>
+                    </a:p>
+                  </a:txBody>
+                  <a:tcPr/>
+                </a:tc>
+              </a:tr>
+            </a:tbl>
+          </a:graphicData>
+        </a:graphic>
+      </p:graphicFrame>
+      <p:graphicFrame>
+        <p:nvGraphicFramePr>
+          <p:cNvPr id="5" name="Tableau 2" title="{{table3}}"/>
+          <p:cNvGraphicFramePr>
+            <a:graphicFrameLocks noGrp="1"/>
+          </p:cNvGraphicFramePr>
+          <p:nvPr>
+            <p:extLst>
+              <p:ext uri="{D42A27DB-BD31-4B8C-83A1-F6EECF244321}">
+                <p14:modId xmlns:p14="http://schemas.microsoft.com/office/powerpoint/2010/main" val="3456051333"/>
+              </p:ext>
+            </p:extLst>
+          </p:nvPr>
+        </p:nvGraphicFramePr>
+        <p:xfrm>
+          <a:off x="1139787" y="4797152"/>
           <a:ext cx="6864426" cy="1849120"/>
         </p:xfrm>
         <a:graphic>

</xml_diff>